<commit_message>
polish ui + bug fixes
</commit_message>
<xml_diff>
--- a/ProjectMileStone2/MileStone2.pptx
+++ b/ProjectMileStone2/MileStone2.pptx
@@ -9,9 +9,10 @@
     <p:sldId id="257" r:id="rId3"/>
     <p:sldId id="260" r:id="rId4"/>
     <p:sldId id="258" r:id="rId5"/>
-    <p:sldId id="259" r:id="rId6"/>
+    <p:sldId id="264" r:id="rId6"/>
     <p:sldId id="262" r:id="rId7"/>
     <p:sldId id="263" r:id="rId8"/>
+    <p:sldId id="265" r:id="rId9"/>
   </p:sldIdLst>
   <p:sldSz cx="12192000" cy="6858000"/>
   <p:notesSz cx="6858000" cy="9144000"/>
@@ -4063,7 +4064,7 @@
             <a:pPr lvl="2"/>
             <a:r>
               <a:rPr lang="en-US" dirty="0"/>
-              <a:t>Record sensor data from MetaWear Board</a:t>
+              <a:t>Record sensor data from MetaWear Board and process</a:t>
             </a:r>
           </a:p>
           <a:p>
@@ -4389,7 +4390,7 @@
             </a:pPr>
             <a:r>
               <a:rPr lang="en-US" dirty="0"/>
-              <a:t>Acceptance Criteria: A user will be able to view current speed, average speed, distance and time</a:t>
+              <a:t>Acceptance Criteria: A user will be able to view current speed, average speed, distance time and current temperature</a:t>
             </a:r>
           </a:p>
           <a:p>
@@ -4514,7 +4515,7 @@
           <p:cNvPr id="2" name="Title 1">
             <a:extLst>
               <a:ext uri="{FF2B5EF4-FFF2-40B4-BE49-F238E27FC236}">
-                <a16:creationId xmlns:a16="http://schemas.microsoft.com/office/drawing/2014/main" id="{CF4B6F10-0358-204E-8A33-563F60ED265C}"/>
+                <a16:creationId xmlns:a16="http://schemas.microsoft.com/office/drawing/2014/main" id="{276F4EFD-2D1D-E04C-A8B5-A671D4A7307A}"/>
               </a:ext>
             </a:extLst>
           </p:cNvPr>
@@ -4532,7 +4533,7 @@
           <a:p>
             <a:r>
               <a:rPr lang="en-US" dirty="0"/>
-              <a:t>CODE EXPLORATION</a:t>
+              <a:t>USER STORIES REALISATION</a:t>
             </a:r>
           </a:p>
         </p:txBody>
@@ -4542,7 +4543,7 @@
           <p:cNvPr id="3" name="Content Placeholder 2">
             <a:extLst>
               <a:ext uri="{FF2B5EF4-FFF2-40B4-BE49-F238E27FC236}">
-                <a16:creationId xmlns:a16="http://schemas.microsoft.com/office/drawing/2014/main" id="{C79EC88C-4DFF-894B-B4A1-C3335142F021}"/>
+                <a16:creationId xmlns:a16="http://schemas.microsoft.com/office/drawing/2014/main" id="{8020F7B4-2A07-0D4E-BCD8-255C52A7316C}"/>
               </a:ext>
             </a:extLst>
           </p:cNvPr>
@@ -4555,109 +4556,130 @@
         </p:nvSpPr>
         <p:spPr/>
         <p:txBody>
-          <a:bodyPr anchor="t"/>
+          <a:bodyPr anchor="t">
+            <a:normAutofit fontScale="85000" lnSpcReduction="20000"/>
+          </a:bodyPr>
           <a:lstStyle/>
           <a:p>
-            <a:pPr marL="0" indent="0">
-              <a:buNone/>
-            </a:pPr>
-            <a:r>
-              <a:rPr lang="en-US" dirty="0"/>
-              <a:t>																ANDROID STUDIO</a:t>
-            </a:r>
-          </a:p>
-          <a:p>
-            <a:pPr marL="0" indent="0">
-              <a:buNone/>
-            </a:pPr>
-            <a:endParaRPr lang="en-US" dirty="0"/>
-          </a:p>
-          <a:p>
-            <a:r>
-              <a:rPr lang="en-US" dirty="0"/>
-              <a:t>Two Activities, 1 Fragment, 1 Service</a:t>
+            <a:r>
+              <a:rPr lang="en-US" dirty="0"/>
+              <a:t>User Story 1:</a:t>
             </a:r>
           </a:p>
           <a:p>
             <a:pPr lvl="1"/>
             <a:r>
               <a:rPr lang="en-US" dirty="0"/>
-              <a:t> MainActivity : Handle Connection with MetaWear</a:t>
+              <a:t>Get linear acceleration from accelerometer + gyroscope values</a:t>
             </a:r>
           </a:p>
           <a:p>
             <a:pPr lvl="1"/>
             <a:r>
               <a:rPr lang="en-US" dirty="0"/>
-              <a:t>DisplayActivity: Maintain Connection with MetaWear, Handles Unexpected Disconnect</a:t>
-            </a:r>
-          </a:p>
-          <a:p>
-            <a:pPr lvl="2"/>
-            <a:r>
-              <a:rPr lang="en-US" dirty="0"/>
-              <a:t>DisplayActivityFragment1:  Stream data from board,  Handle user input, process data, display meaningful values to user</a:t>
+              <a:t>Offset value to calibrate acceleration value</a:t>
             </a:r>
           </a:p>
           <a:p>
             <a:pPr lvl="1"/>
             <a:r>
               <a:rPr lang="en-US" dirty="0"/>
-              <a:t>GPS_Service: Return travelled distance</a:t>
-            </a:r>
-          </a:p>
-        </p:txBody>
-      </p:sp>
-      <p:sp>
-        <p:nvSpPr>
-          <p:cNvPr id="4" name="Right Arrow 3">
-            <a:extLst>
-              <a:ext uri="{FF2B5EF4-FFF2-40B4-BE49-F238E27FC236}">
-                <a16:creationId xmlns:a16="http://schemas.microsoft.com/office/drawing/2014/main" id="{39E22304-404B-574C-9A7B-6C4DE5A3C355}"/>
-              </a:ext>
-            </a:extLst>
-          </p:cNvPr>
-          <p:cNvSpPr/>
-          <p:nvPr/>
-        </p:nvSpPr>
-        <p:spPr>
-          <a:xfrm>
-            <a:off x="10043264" y="2263624"/>
-            <a:ext cx="1567543" cy="213756"/>
-          </a:xfrm>
-          <a:prstGeom prst="rightArrow">
-            <a:avLst/>
-          </a:prstGeom>
-        </p:spPr>
-        <p:style>
-          <a:lnRef idx="2">
-            <a:schemeClr val="accent1">
-              <a:shade val="50000"/>
-            </a:schemeClr>
-          </a:lnRef>
-          <a:fillRef idx="1">
-            <a:schemeClr val="accent1"/>
-          </a:fillRef>
-          <a:effectRef idx="0">
-            <a:schemeClr val="accent1"/>
-          </a:effectRef>
-          <a:fontRef idx="minor">
-            <a:schemeClr val="lt1"/>
-          </a:fontRef>
-        </p:style>
-        <p:txBody>
-          <a:bodyPr rtlCol="0" anchor="ctr"/>
-          <a:lstStyle/>
-          <a:p>
-            <a:pPr algn="ctr"/>
-            <a:endParaRPr lang="en-US"/>
+              <a:t>V(k+1) = </a:t>
+            </a:r>
+            <a:r>
+              <a:rPr lang="en-US" dirty="0" err="1"/>
+              <a:t>Vk</a:t>
+            </a:r>
+            <a:r>
+              <a:rPr lang="en-US" dirty="0"/>
+              <a:t> + Ak * </a:t>
+            </a:r>
+            <a:r>
+              <a:rPr lang="en-US" dirty="0" err="1"/>
+              <a:t>Δt</a:t>
+            </a:r>
+            <a:endParaRPr lang="en-US" dirty="0"/>
+          </a:p>
+          <a:p>
+            <a:pPr lvl="1"/>
+            <a:r>
+              <a:rPr lang="en-US" dirty="0"/>
+              <a:t>For each axis, find v and the total velocity equal sqrt(vx^2+vy^2+vz^2)</a:t>
+            </a:r>
+          </a:p>
+          <a:p>
+            <a:pPr lvl="1"/>
+            <a:r>
+              <a:rPr lang="en-US" dirty="0"/>
+              <a:t>Movement end check:  If next 25 samples equals 0 then you stopped</a:t>
+            </a:r>
+          </a:p>
+          <a:p>
+            <a:pPr lvl="1"/>
+            <a:r>
+              <a:rPr lang="en-US" dirty="0"/>
+              <a:t>Request temperature data every 3 s from board</a:t>
+            </a:r>
+          </a:p>
+          <a:p>
+            <a:pPr lvl="1"/>
+            <a:r>
+              <a:rPr lang="en-US" dirty="0"/>
+              <a:t>Used device </a:t>
+            </a:r>
+            <a:r>
+              <a:rPr lang="en-US" dirty="0" err="1"/>
+              <a:t>gps</a:t>
+            </a:r>
+            <a:r>
+              <a:rPr lang="en-US" dirty="0"/>
+              <a:t> to find distance (inaccurate)</a:t>
+            </a:r>
+          </a:p>
+          <a:p>
+            <a:r>
+              <a:rPr lang="en-US" dirty="0"/>
+              <a:t>User Story 2</a:t>
+            </a:r>
+          </a:p>
+          <a:p>
+            <a:pPr lvl="1"/>
+            <a:r>
+              <a:rPr lang="en-US" dirty="0"/>
+              <a:t>Simple input box to enter speed</a:t>
+            </a:r>
+          </a:p>
+          <a:p>
+            <a:r>
+              <a:rPr lang="en-US" dirty="0"/>
+              <a:t>User Story 3</a:t>
+            </a:r>
+          </a:p>
+          <a:p>
+            <a:pPr lvl="1"/>
+            <a:r>
+              <a:rPr lang="en-US" dirty="0"/>
+              <a:t>If threshold &gt; current </a:t>
+            </a:r>
+            <a:r>
+              <a:rPr lang="en-US" dirty="0" err="1"/>
+              <a:t>vel</a:t>
+            </a:r>
+            <a:r>
+              <a:rPr lang="en-US" dirty="0"/>
+              <a:t> then vibrate</a:t>
+            </a:r>
+          </a:p>
+          <a:p>
+            <a:pPr lvl="1"/>
+            <a:endParaRPr lang="en-US" dirty="0"/>
           </a:p>
         </p:txBody>
       </p:sp>
     </p:spTree>
     <p:extLst>
       <p:ext uri="{BB962C8B-B14F-4D97-AF65-F5344CB8AC3E}">
-        <p14:creationId xmlns:p14="http://schemas.microsoft.com/office/powerpoint/2010/main" val="124444532"/>
+        <p14:creationId xmlns:p14="http://schemas.microsoft.com/office/powerpoint/2010/main" val="236633378"/>
       </p:ext>
     </p:extLst>
   </p:cSld>
@@ -4739,19 +4761,25 @@
             </a:r>
             <a:r>
               <a:rPr lang="en-US" dirty="0"/>
-              <a:t> Web (http://</a:t>
-            </a:r>
-            <a:r>
-              <a:rPr lang="en-US" dirty="0" err="1"/>
-              <a:t>web.</a:t>
-            </a:r>
-            <a:r>
-              <a:rPr lang="en-US" err="1"/>
-              <a:t>airdroid</a:t>
-            </a:r>
-            <a:r>
-              <a:rPr lang="en-US"/>
-              <a:t>.com/) </a:t>
+              <a:t> Web (</a:t>
+            </a:r>
+            <a:r>
+              <a:rPr lang="en-US" dirty="0">
+                <a:hlinkClick r:id="rId2"/>
+              </a:rPr>
+              <a:t>http://</a:t>
+            </a:r>
+            <a:r>
+              <a:rPr lang="en-US" dirty="0" err="1">
+                <a:hlinkClick r:id="rId2"/>
+              </a:rPr>
+              <a:t>web.airdroid.com</a:t>
+            </a:r>
+            <a:r>
+              <a:rPr lang="en-US" dirty="0">
+                <a:hlinkClick r:id="rId2"/>
+              </a:rPr>
+              <a:t>/) </a:t>
             </a:r>
             <a:r>
               <a:rPr lang="en-US" dirty="0"/>
@@ -4850,12 +4878,115 @@
               <a:t>Algorithms Improvement</a:t>
             </a:r>
           </a:p>
+          <a:p>
+            <a:r>
+              <a:rPr lang="en-US" dirty="0"/>
+              <a:t>Add more metrics (maybe?)</a:t>
+            </a:r>
+          </a:p>
+          <a:p>
+            <a:r>
+              <a:rPr lang="en-US" dirty="0"/>
+              <a:t>Pause button</a:t>
+            </a:r>
+          </a:p>
         </p:txBody>
       </p:sp>
     </p:spTree>
     <p:extLst>
       <p:ext uri="{BB962C8B-B14F-4D97-AF65-F5344CB8AC3E}">
         <p14:creationId xmlns:p14="http://schemas.microsoft.com/office/powerpoint/2010/main" val="1385178743"/>
+      </p:ext>
+    </p:extLst>
+  </p:cSld>
+  <p:clrMapOvr>
+    <a:masterClrMapping/>
+  </p:clrMapOvr>
+</p:sld>
+</file>
+
+<file path=ppt/slides/slide8.xml><?xml version="1.0" encoding="utf-8"?>
+<p:sld xmlns:a="http://schemas.openxmlformats.org/drawingml/2006/main" xmlns:r="http://schemas.openxmlformats.org/officeDocument/2006/relationships" xmlns:p="http://schemas.openxmlformats.org/presentationml/2006/main">
+  <p:cSld>
+    <p:spTree>
+      <p:nvGrpSpPr>
+        <p:cNvPr id="1" name=""/>
+        <p:cNvGrpSpPr/>
+        <p:nvPr/>
+      </p:nvGrpSpPr>
+      <p:grpSpPr>
+        <a:xfrm>
+          <a:off x="0" y="0"/>
+          <a:ext cx="0" cy="0"/>
+          <a:chOff x="0" y="0"/>
+          <a:chExt cx="0" cy="0"/>
+        </a:xfrm>
+      </p:grpSpPr>
+      <p:sp>
+        <p:nvSpPr>
+          <p:cNvPr id="2" name="Title 1">
+            <a:extLst>
+              <a:ext uri="{FF2B5EF4-FFF2-40B4-BE49-F238E27FC236}">
+                <a16:creationId xmlns:a16="http://schemas.microsoft.com/office/drawing/2014/main" id="{AA4F453C-3A38-1344-A090-4030BB1EC91A}"/>
+              </a:ext>
+            </a:extLst>
+          </p:cNvPr>
+          <p:cNvSpPr>
+            <a:spLocks noGrp="1"/>
+          </p:cNvSpPr>
+          <p:nvPr>
+            <p:ph type="title"/>
+          </p:nvPr>
+        </p:nvSpPr>
+        <p:spPr/>
+        <p:txBody>
+          <a:bodyPr/>
+          <a:lstStyle/>
+          <a:p>
+            <a:r>
+              <a:rPr lang="en-US" dirty="0"/>
+              <a:t>Question</a:t>
+            </a:r>
+          </a:p>
+        </p:txBody>
+      </p:sp>
+      <p:sp>
+        <p:nvSpPr>
+          <p:cNvPr id="3" name="Content Placeholder 2">
+            <a:extLst>
+              <a:ext uri="{FF2B5EF4-FFF2-40B4-BE49-F238E27FC236}">
+                <a16:creationId xmlns:a16="http://schemas.microsoft.com/office/drawing/2014/main" id="{7B22EE86-D45B-CB4F-9805-2AA7054DE1F1}"/>
+              </a:ext>
+            </a:extLst>
+          </p:cNvPr>
+          <p:cNvSpPr>
+            <a:spLocks noGrp="1"/>
+          </p:cNvSpPr>
+          <p:nvPr>
+            <p:ph idx="1"/>
+          </p:nvPr>
+        </p:nvSpPr>
+        <p:spPr/>
+        <p:txBody>
+          <a:bodyPr>
+            <a:normAutofit/>
+          </a:bodyPr>
+          <a:lstStyle/>
+          <a:p>
+            <a:pPr marL="0" indent="0" algn="ctr">
+              <a:buNone/>
+            </a:pPr>
+            <a:r>
+              <a:rPr lang="en-US" sz="4400" dirty="0"/>
+              <a:t>?</a:t>
+            </a:r>
+          </a:p>
+        </p:txBody>
+      </p:sp>
+    </p:spTree>
+    <p:extLst>
+      <p:ext uri="{BB962C8B-B14F-4D97-AF65-F5344CB8AC3E}">
+        <p14:creationId xmlns:p14="http://schemas.microsoft.com/office/powerpoint/2010/main" val="3255888987"/>
       </p:ext>
     </p:extLst>
   </p:cSld>

</xml_diff>